<commit_message>
MDP planning Q Learning
</commit_message>
<xml_diff>
--- a/PPTs/L7.2 Q-Learning.pptx
+++ b/PPTs/L7.2 Q-Learning.pptx
@@ -8464,8 +8464,8 @@
           </a:p>
         </p:txBody>
       </p:sp>
-      <mc:AlternateContent xmlns:mc="http://schemas.openxmlformats.org/markup-compatibility/2006" xmlns:a14="http://schemas.microsoft.com/office/drawing/2010/main">
-        <mc:Choice Requires="a14">
+      <mc:AlternateContent xmlns:mc="http://schemas.openxmlformats.org/markup-compatibility/2006">
+        <mc:Choice xmlns:a14="http://schemas.microsoft.com/office/drawing/2010/main" Requires="a14">
           <p:sp>
             <p:nvSpPr>
               <p:cNvPr id="3" name="Content Placeholder 2">
@@ -8511,14 +8511,14 @@
                 <a:pPr lvl="1"/>
                 <a:r>
                   <a:rPr lang="en-US" dirty="0"/>
-                  <a:t>Given a state and action, our Q-Function will search into its Q-table the corresponding value.</a:t>
+                  <a:t>Given a state and an action, our Q-Function will search into its Q-table the corresponding value.</a:t>
                 </a:r>
               </a:p>
               <a:p>
                 <a:pPr lvl="1"/>
                 <a:r>
                   <a:rPr lang="en-US" dirty="0"/>
-                  <a:t>When the training is done, we have an optimal Q-function</a:t>
+                  <a:t>When the training is done, we have an accurate Q-function</a:t>
                 </a:r>
               </a:p>
               <a:p>
@@ -8532,7 +8532,7 @@
                 </a:r>
                 <a:r>
                   <a:rPr lang="en-US" dirty="0"/>
-                  <a:t>: given the optimal Q-function, the optimal policy is to choose the greedy (best) action that results in the highest Q value </a:t>
+                  <a:t>: given the accurate Q-function, the optimal policy is to choose the greedy (best) action that results in the highest Q value </a:t>
                 </a:r>
                 <a14:m>
                   <m:oMath xmlns:m="http://schemas.openxmlformats.org/officeDocument/2006/math">
@@ -8625,7 +8625,7 @@
             </p:txBody>
           </p:sp>
         </mc:Choice>
-        <mc:Fallback xmlns="">
+        <mc:Fallback>
           <p:sp>
             <p:nvSpPr>
               <p:cNvPr id="3" name="Content Placeholder 2">
@@ -9596,8 +9596,8 @@
           </p:sp>
         </mc:Fallback>
       </mc:AlternateContent>
-      <mc:AlternateContent xmlns:mc="http://schemas.openxmlformats.org/markup-compatibility/2006" xmlns:a14="http://schemas.microsoft.com/office/drawing/2010/main">
-        <mc:Choice Requires="a14">
+      <mc:AlternateContent xmlns:mc="http://schemas.openxmlformats.org/markup-compatibility/2006">
+        <mc:Choice xmlns:a14="http://schemas.microsoft.com/office/drawing/2010/main" Requires="a14">
           <p:sp>
             <p:nvSpPr>
               <p:cNvPr id="3" name="Content Placeholder 2">
@@ -9616,13 +9616,13 @@
             </p:nvSpPr>
             <p:spPr>
               <a:xfrm>
-                <a:off x="457200" y="1295399"/>
+                <a:off x="457200" y="1180067"/>
                 <a:ext cx="8229600" cy="2857123"/>
               </a:xfrm>
             </p:spPr>
             <p:txBody>
               <a:bodyPr>
-                <a:normAutofit fontScale="92500" lnSpcReduction="20000"/>
+                <a:normAutofit fontScale="70000" lnSpcReduction="20000"/>
               </a:bodyPr>
               <a:lstStyle/>
               <a:p>
@@ -9968,12 +9968,132 @@
                 <a:endParaRPr lang="en-US" dirty="0"/>
               </a:p>
               <a:p>
+                <a:pPr lvl="1"/>
+                <a:r>
+                  <a:rPr lang="en-US" dirty="0"/>
+                  <a:t>e.g., if </a:t>
+                </a:r>
+                <a14:m>
+                  <m:oMath xmlns:m="http://schemas.openxmlformats.org/officeDocument/2006/math">
+                    <m:r>
+                      <a:rPr lang="en-US" i="1" smtClean="0">
+                        <a:latin typeface="Cambria Math" panose="02040503050406030204" pitchFamily="18" charset="0"/>
+                      </a:rPr>
+                      <m:t>𝜖</m:t>
+                    </m:r>
+                    <m:r>
+                      <a:rPr lang="en-US" b="0" i="1" smtClean="0">
+                        <a:latin typeface="Cambria Math" panose="02040503050406030204" pitchFamily="18" charset="0"/>
+                      </a:rPr>
+                      <m:t>=.1</m:t>
+                    </m:r>
+                  </m:oMath>
+                </a14:m>
+                <a:r>
+                  <a:rPr lang="en-US" dirty="0"/>
+                  <a:t>, select each non-greedy action w. prob </a:t>
+                </a:r>
+                <a14:m>
+                  <m:oMath xmlns:m="http://schemas.openxmlformats.org/officeDocument/2006/math">
+                    <m:f>
+                      <m:fPr>
+                        <m:ctrlPr>
+                          <a:rPr lang="en-US" i="1">
+                            <a:latin typeface="Cambria Math" panose="02040503050406030204" pitchFamily="18" charset="0"/>
+                          </a:rPr>
+                        </m:ctrlPr>
+                      </m:fPr>
+                      <m:num>
+                        <m:r>
+                          <a:rPr lang="en-US" b="0" i="1" smtClean="0">
+                            <a:latin typeface="Cambria Math" panose="02040503050406030204" pitchFamily="18" charset="0"/>
+                          </a:rPr>
+                          <m:t>.1</m:t>
+                        </m:r>
+                      </m:num>
+                      <m:den>
+                        <m:r>
+                          <a:rPr lang="en-US" b="0" i="1" smtClean="0">
+                            <a:latin typeface="Cambria Math" panose="02040503050406030204" pitchFamily="18" charset="0"/>
+                          </a:rPr>
+                          <m:t>6</m:t>
+                        </m:r>
+                      </m:den>
+                    </m:f>
+                    <m:r>
+                      <a:rPr lang="en-US" b="0" i="1" smtClean="0">
+                        <a:latin typeface="Cambria Math" panose="02040503050406030204" pitchFamily="18" charset="0"/>
+                      </a:rPr>
+                      <m:t>=.017</m:t>
+                    </m:r>
+                  </m:oMath>
+                </a14:m>
+                <a:r>
+                  <a:rPr lang="en-US" dirty="0"/>
+                  <a:t>; the greedy action w. prob </a:t>
+                </a:r>
+                <a14:m>
+                  <m:oMath xmlns:m="http://schemas.openxmlformats.org/officeDocument/2006/math">
+                    <m:r>
+                      <a:rPr lang="en-US">
+                        <a:latin typeface="Cambria Math" panose="02040503050406030204" pitchFamily="18" charset="0"/>
+                      </a:rPr>
+                      <m:t>1−</m:t>
+                    </m:r>
+                    <m:r>
+                      <a:rPr lang="en-US" b="0" i="1" smtClean="0">
+                        <a:latin typeface="Cambria Math" panose="02040503050406030204" pitchFamily="18" charset="0"/>
+                      </a:rPr>
+                      <m:t>.1</m:t>
+                    </m:r>
+                    <m:r>
+                      <a:rPr lang="en-US" i="1">
+                        <a:latin typeface="Cambria Math" panose="02040503050406030204" pitchFamily="18" charset="0"/>
+                      </a:rPr>
+                      <m:t>+</m:t>
+                    </m:r>
+                    <m:f>
+                      <m:fPr>
+                        <m:ctrlPr>
+                          <a:rPr lang="en-US" i="1">
+                            <a:latin typeface="Cambria Math" panose="02040503050406030204" pitchFamily="18" charset="0"/>
+                          </a:rPr>
+                        </m:ctrlPr>
+                      </m:fPr>
+                      <m:num>
+                        <m:r>
+                          <a:rPr lang="en-US" b="0" i="1" smtClean="0">
+                            <a:latin typeface="Cambria Math" panose="02040503050406030204" pitchFamily="18" charset="0"/>
+                          </a:rPr>
+                          <m:t>.1</m:t>
+                        </m:r>
+                      </m:num>
+                      <m:den>
+                        <m:r>
+                          <a:rPr lang="en-US" b="0" i="1" smtClean="0">
+                            <a:latin typeface="Cambria Math" panose="02040503050406030204" pitchFamily="18" charset="0"/>
+                          </a:rPr>
+                          <m:t>6</m:t>
+                        </m:r>
+                      </m:den>
+                    </m:f>
+                    <m:r>
+                      <a:rPr lang="en-US" b="0" i="1" smtClean="0">
+                        <a:latin typeface="Cambria Math" panose="02040503050406030204" pitchFamily="18" charset="0"/>
+                      </a:rPr>
+                      <m:t>=.917</m:t>
+                    </m:r>
+                  </m:oMath>
+                </a14:m>
+                <a:endParaRPr lang="en-US" dirty="0"/>
+              </a:p>
+              <a:p>
                 <a:endParaRPr lang="en-SE" dirty="0"/>
               </a:p>
             </p:txBody>
           </p:sp>
         </mc:Choice>
-        <mc:Fallback xmlns="">
+        <mc:Fallback>
           <p:sp>
             <p:nvSpPr>
               <p:cNvPr id="3" name="Content Placeholder 2">
@@ -9992,13 +10112,13 @@
             </p:nvSpPr>
             <p:spPr>
               <a:xfrm>
-                <a:off x="457200" y="1295399"/>
+                <a:off x="457200" y="1180067"/>
                 <a:ext cx="8229600" cy="2857123"/>
               </a:xfrm>
               <a:blipFill>
                 <a:blip r:embed="rId3"/>
                 <a:stretch>
-                  <a:fillRect t="-5757" r="-815"/>
+                  <a:fillRect l="-889" t="-3632"/>
                 </a:stretch>
               </a:blipFill>
             </p:spPr>
@@ -10486,8 +10606,8 @@
           </a:p>
         </p:txBody>
       </p:sp>
-      <mc:AlternateContent xmlns:mc="http://schemas.openxmlformats.org/markup-compatibility/2006" xmlns:a14="http://schemas.microsoft.com/office/drawing/2010/main">
-        <mc:Choice Requires="a14">
+      <mc:AlternateContent xmlns:mc="http://schemas.openxmlformats.org/markup-compatibility/2006">
+        <mc:Choice xmlns:a14="http://schemas.microsoft.com/office/drawing/2010/main" Requires="a14">
           <p:sp>
             <p:nvSpPr>
               <p:cNvPr id="3" name="Content Placeholder 2">
@@ -10537,7 +10657,7 @@
               <a:p>
                 <a:r>
                   <a:rPr lang="en-US" dirty="0"/>
-                  <a:t>The episode ends if rat eats the poison, east the big pile of cheese, or if it spends more than 5 steps.</a:t>
+                  <a:t>The episode ends if rat eats the poison, eats the big pile of cheese, or if it spends more than 5 steps.</a:t>
                 </a:r>
               </a:p>
               <a:p>
@@ -10595,7 +10715,7 @@
             </p:txBody>
           </p:sp>
         </mc:Choice>
-        <mc:Fallback xmlns="">
+        <mc:Fallback>
           <p:sp>
             <p:nvSpPr>
               <p:cNvPr id="3" name="Content Placeholder 2">
@@ -12273,7 +12393,7 @@
         </p:blipFill>
         <p:spPr>
           <a:xfrm>
-            <a:off x="258792" y="2019322"/>
+            <a:off x="258792" y="1632138"/>
             <a:ext cx="3867690" cy="2267266"/>
           </a:xfrm>
           <a:prstGeom prst="rect">
@@ -12303,7 +12423,7 @@
         </p:blipFill>
         <p:spPr>
           <a:xfrm>
-            <a:off x="4914091" y="2019322"/>
+            <a:off x="4914091" y="1632138"/>
             <a:ext cx="3867690" cy="2267266"/>
           </a:xfrm>
           <a:prstGeom prst="rect">
@@ -12325,7 +12445,7 @@
         </p:nvSpPr>
         <p:spPr bwMode="auto">
           <a:xfrm>
-            <a:off x="4301794" y="2777707"/>
+            <a:off x="4301794" y="2390523"/>
             <a:ext cx="540411" cy="388188"/>
           </a:xfrm>
           <a:prstGeom prst="rightArrow">
@@ -12384,6 +12504,53 @@
           </a:p>
         </p:txBody>
       </p:sp>
+      <p:pic>
+        <p:nvPicPr>
+          <p:cNvPr id="3" name="Picture 2" descr="Maze example">
+            <a:extLst>
+              <a:ext uri="{FF2B5EF4-FFF2-40B4-BE49-F238E27FC236}">
+                <a16:creationId xmlns:a16="http://schemas.microsoft.com/office/drawing/2014/main" id="{F0F07DD9-FF4C-78EE-D555-536F64D55013}"/>
+              </a:ext>
+            </a:extLst>
+          </p:cNvPr>
+          <p:cNvPicPr>
+            <a:picLocks noChangeAspect="1" noChangeArrowheads="1"/>
+          </p:cNvPicPr>
+          <p:nvPr/>
+        </p:nvPicPr>
+        <p:blipFill>
+          <a:blip r:embed="rId4">
+            <a:extLst>
+              <a:ext uri="{28A0092B-C50C-407E-A947-70E740481C1C}">
+                <a14:useLocalDpi xmlns:a14="http://schemas.microsoft.com/office/drawing/2010/main" val="0"/>
+              </a:ext>
+            </a:extLst>
+          </a:blip>
+          <a:srcRect/>
+          <a:stretch>
+            <a:fillRect/>
+          </a:stretch>
+        </p:blipFill>
+        <p:spPr bwMode="auto">
+          <a:xfrm>
+            <a:off x="2402318" y="3961867"/>
+            <a:ext cx="4339364" cy="2690405"/>
+          </a:xfrm>
+          <a:prstGeom prst="rect">
+            <a:avLst/>
+          </a:prstGeom>
+          <a:noFill/>
+          <a:extLst>
+            <a:ext uri="{909E8E84-426E-40DD-AFC4-6F175D3DCCD1}">
+              <a14:hiddenFill xmlns:a14="http://schemas.microsoft.com/office/drawing/2010/main">
+                <a:solidFill>
+                  <a:srgbClr val="FFFFFF"/>
+                </a:solidFill>
+              </a14:hiddenFill>
+            </a:ext>
+          </a:extLst>
+        </p:spPr>
+      </p:pic>
     </p:spTree>
     <p:extLst>
       <p:ext uri="{BB962C8B-B14F-4D97-AF65-F5344CB8AC3E}">

</xml_diff>